<commit_message>
release chapter highly cited
</commit_message>
<xml_diff>
--- a/_book/plot/china-category-1.pptx
+++ b/_book/plot/china-category-1.pptx
@@ -3123,7 +3123,7 @@
           <p:spPr>
             <a:xfrm>
               <a:off x="2148681" y="1495425"/>
-              <a:ext cx="6400800" cy="4571999"/>
+              <a:ext cx="6400799" cy="4571999"/>
             </a:xfrm>
             <a:prstGeom prst="rect">
               <a:avLst/>
@@ -4372,8 +4372,8 @@
           </p:nvSpPr>
           <p:spPr>
             <a:xfrm>
-              <a:off x="6673018" y="3610041"/>
-              <a:ext cx="905473" cy="59468"/>
+              <a:off x="6672256" y="3609892"/>
+              <a:ext cx="906997" cy="59568"/>
             </a:xfrm>
             <a:prstGeom prst="rect">
               <a:avLst/>
@@ -4386,7 +4386,7 @@
             <a:p>
               <a:pPr algn="l" marL="0" marR="0" indent="0">
                 <a:lnSpc>
-                  <a:spcPts val="632"/>
+                  <a:spcPts val="633"/>
                 </a:lnSpc>
                 <a:spcBef>
                   <a:spcPts val="0"/>
@@ -4396,7 +4396,7 @@
                 </a:spcAft>
               </a:pPr>
               <a:r>
-                <a:rPr sz="632" b="1">
+                <a:rPr sz="633" b="1">
                   <a:solidFill>
                     <a:srgbClr val="000000">
                       <a:alpha val="100000"/>
@@ -4418,8 +4418,8 @@
           </p:nvSpPr>
           <p:spPr>
             <a:xfrm>
-              <a:off x="6844740" y="3725690"/>
-              <a:ext cx="562030" cy="59429"/>
+              <a:off x="6844267" y="3725735"/>
+              <a:ext cx="562976" cy="59529"/>
             </a:xfrm>
             <a:prstGeom prst="rect">
               <a:avLst/>
@@ -4432,7 +4432,7 @@
             <a:p>
               <a:pPr algn="l" marL="0" marR="0" indent="0">
                 <a:lnSpc>
-                  <a:spcPts val="632"/>
+                  <a:spcPts val="633"/>
                 </a:lnSpc>
                 <a:spcBef>
                   <a:spcPts val="0"/>
@@ -4442,7 +4442,7 @@
                 </a:spcAft>
               </a:pPr>
               <a:r>
-                <a:rPr sz="632" b="1">
+                <a:rPr sz="633" b="1">
                   <a:solidFill>
                     <a:srgbClr val="000000">
                       <a:alpha val="100000"/>
@@ -4510,8 +4510,8 @@
           </p:nvSpPr>
           <p:spPr>
             <a:xfrm>
-              <a:off x="7793113" y="4734792"/>
-              <a:ext cx="384402" cy="69761"/>
+              <a:off x="7790934" y="4732805"/>
+              <a:ext cx="388762" cy="70552"/>
             </a:xfrm>
             <a:prstGeom prst="rect">
               <a:avLst/>
@@ -4524,7 +4524,7 @@
             <a:p>
               <a:pPr algn="l" marL="0" marR="0" indent="0">
                 <a:lnSpc>
-                  <a:spcPts val="767"/>
+                  <a:spcPts val="776"/>
                 </a:lnSpc>
                 <a:spcBef>
                   <a:spcPts val="0"/>
@@ -4534,7 +4534,7 @@
                 </a:spcAft>
               </a:pPr>
               <a:r>
-                <a:rPr sz="767" b="1">
+                <a:rPr sz="776" b="1">
                   <a:solidFill>
                     <a:srgbClr val="000000">
                       <a:alpha val="100000"/>
@@ -4556,8 +4556,8 @@
           </p:nvSpPr>
           <p:spPr>
             <a:xfrm>
-              <a:off x="7641527" y="4872703"/>
-              <a:ext cx="687575" cy="72188"/>
+              <a:off x="7637628" y="4872280"/>
+              <a:ext cx="695373" cy="73007"/>
             </a:xfrm>
             <a:prstGeom prst="rect">
               <a:avLst/>
@@ -4570,7 +4570,7 @@
             <a:p>
               <a:pPr algn="l" marL="0" marR="0" indent="0">
                 <a:lnSpc>
-                  <a:spcPts val="767"/>
+                  <a:spcPts val="776"/>
                 </a:lnSpc>
                 <a:spcBef>
                   <a:spcPts val="0"/>
@@ -4580,7 +4580,7 @@
                 </a:spcAft>
               </a:pPr>
               <a:r>
-                <a:rPr sz="767" b="1">
+                <a:rPr sz="776" b="1">
                   <a:solidFill>
                     <a:srgbClr val="000000">
                       <a:alpha val="100000"/>
@@ -4602,8 +4602,8 @@
           </p:nvSpPr>
           <p:spPr>
             <a:xfrm>
-              <a:off x="7760612" y="5013089"/>
-              <a:ext cx="449405" cy="72140"/>
+              <a:off x="7758064" y="5014258"/>
+              <a:ext cx="454502" cy="72959"/>
             </a:xfrm>
             <a:prstGeom prst="rect">
               <a:avLst/>
@@ -4616,7 +4616,7 @@
             <a:p>
               <a:pPr algn="l" marL="0" marR="0" indent="0">
                 <a:lnSpc>
-                  <a:spcPts val="767"/>
+                  <a:spcPts val="776"/>
                 </a:lnSpc>
                 <a:spcBef>
                   <a:spcPts val="0"/>
@@ -4626,7 +4626,7 @@
                 </a:spcAft>
               </a:pPr>
               <a:r>
-                <a:rPr sz="767" b="1">
+                <a:rPr sz="776" b="1">
                   <a:solidFill>
                     <a:srgbClr val="000000">
                       <a:alpha val="100000"/>
@@ -5016,8 +5016,8 @@
           </p:nvSpPr>
           <p:spPr>
             <a:xfrm>
-              <a:off x="6815261" y="4814211"/>
-              <a:ext cx="758024" cy="64332"/>
+              <a:off x="6848723" y="4822669"/>
+              <a:ext cx="691099" cy="58652"/>
             </a:xfrm>
             <a:prstGeom prst="rect">
               <a:avLst/>
@@ -5030,7 +5030,7 @@
             <a:p>
               <a:pPr algn="l" marL="0" marR="0" indent="0">
                 <a:lnSpc>
-                  <a:spcPts val="684"/>
+                  <a:spcPts val="623"/>
                 </a:lnSpc>
                 <a:spcBef>
                   <a:spcPts val="0"/>
@@ -5040,7 +5040,7 @@
                 </a:spcAft>
               </a:pPr>
               <a:r>
-                <a:rPr sz="684" b="1">
+                <a:rPr sz="623" b="1">
                   <a:solidFill>
                     <a:srgbClr val="000000">
                       <a:alpha val="100000"/>
@@ -5062,8 +5062,8 @@
           </p:nvSpPr>
           <p:spPr>
             <a:xfrm>
-              <a:off x="6943204" y="4939358"/>
-              <a:ext cx="502138" cy="64332"/>
+              <a:off x="6965370" y="4936767"/>
+              <a:ext cx="457805" cy="58652"/>
             </a:xfrm>
             <a:prstGeom prst="rect">
               <a:avLst/>
@@ -5076,7 +5076,7 @@
             <a:p>
               <a:pPr algn="l" marL="0" marR="0" indent="0">
                 <a:lnSpc>
-                  <a:spcPts val="684"/>
+                  <a:spcPts val="623"/>
                 </a:lnSpc>
                 <a:spcBef>
                   <a:spcPts val="0"/>
@@ -5086,7 +5086,7 @@
                 </a:spcAft>
               </a:pPr>
               <a:r>
-                <a:rPr sz="684" b="1">
+                <a:rPr sz="623" b="1">
                   <a:solidFill>
                     <a:srgbClr val="000000">
                       <a:alpha val="100000"/>
@@ -5108,8 +5108,8 @@
           </p:nvSpPr>
           <p:spPr>
             <a:xfrm>
-              <a:off x="7623612" y="3582264"/>
-              <a:ext cx="695505" cy="77243"/>
+              <a:off x="7614255" y="3579134"/>
+              <a:ext cx="714219" cy="79321"/>
             </a:xfrm>
             <a:prstGeom prst="rect">
               <a:avLst/>
@@ -5122,7 +5122,7 @@
             <a:p>
               <a:pPr algn="l" marL="0" marR="0" indent="0">
                 <a:lnSpc>
-                  <a:spcPts val="849"/>
+                  <a:spcPts val="872"/>
                 </a:lnSpc>
                 <a:spcBef>
                   <a:spcPts val="0"/>
@@ -5132,7 +5132,7 @@
                 </a:spcAft>
               </a:pPr>
               <a:r>
-                <a:rPr sz="849" b="1">
+                <a:rPr sz="872" b="1">
                   <a:solidFill>
                     <a:srgbClr val="000000">
                       <a:alpha val="100000"/>
@@ -5154,8 +5154,8 @@
           </p:nvSpPr>
           <p:spPr>
             <a:xfrm>
-              <a:off x="7695534" y="3734965"/>
-              <a:ext cx="551662" cy="79930"/>
+              <a:off x="7688112" y="3735944"/>
+              <a:ext cx="566506" cy="82081"/>
             </a:xfrm>
             <a:prstGeom prst="rect">
               <a:avLst/>
@@ -5168,7 +5168,7 @@
             <a:p>
               <a:pPr algn="l" marL="0" marR="0" indent="0">
                 <a:lnSpc>
-                  <a:spcPts val="849"/>
+                  <a:spcPts val="872"/>
                 </a:lnSpc>
                 <a:spcBef>
                   <a:spcPts val="0"/>
@@ -5178,7 +5178,7 @@
                 </a:spcAft>
               </a:pPr>
               <a:r>
-                <a:rPr sz="849" b="1">
+                <a:rPr sz="872" b="1">
                   <a:solidFill>
                     <a:srgbClr val="000000">
                       <a:alpha val="100000"/>

</xml_diff>